<commit_message>
Typo errors in slides fixed
</commit_message>
<xml_diff>
--- a/Slides-RPR/2019-H1-DAA-L05-Algo-Performance.pptx
+++ b/Slides-RPR/2019-H1-DAA-L05-Algo-Performance.pptx
@@ -7086,7 +7086,7 @@
       </p:grpSpPr>
       <p:sp>
         <p:nvSpPr>
-          <p:cNvPr id="116" name="Amortised Efficiency"/>
+          <p:cNvPr id="116" name="Order of Growth"/>
           <p:cNvSpPr txBox="1"/>
           <p:nvPr>
             <p:ph type="title"/>
@@ -7103,84 +7103,14 @@
           <a:p>
             <a:pPr/>
             <a:r>
-              <a:t>Amortised Efficiency</a:t>
+              <a:t>Order of Growth</a:t>
             </a:r>
           </a:p>
         </p:txBody>
       </p:sp>
       <p:sp>
         <p:nvSpPr>
-          <p:cNvPr id="117" name="So far, efficiency is related to a single run of algorithm.…"/>
-          <p:cNvSpPr txBox="1"/>
-          <p:nvPr>
-            <p:ph type="body" idx="1"/>
-          </p:nvPr>
-        </p:nvSpPr>
-        <p:spPr>
-          <a:xfrm>
-            <a:off x="887784" y="938113"/>
-            <a:ext cx="8915318" cy="5891610"/>
-          </a:xfrm>
-          <a:prstGeom prst="rect">
-            <a:avLst/>
-          </a:prstGeom>
-        </p:spPr>
-        <p:txBody>
-          <a:bodyPr/>
-          <a:lstStyle/>
-          <a:p>
-            <a:pPr/>
-            <a:r>
-              <a:t>So far, efficiency is related to a single run of algorithm.</a:t>
-            </a:r>
-          </a:p>
-          <a:p>
-            <a:pPr/>
-            <a:r>
-              <a:t>In some cases, single run can be very expensive, but subsequent run can be much cheaper</a:t>
-            </a:r>
-          </a:p>
-          <a:p>
-            <a:pPr lvl="1"/>
-            <a:r>
-              <a:t>Real life example: </a:t>
-            </a:r>
-          </a:p>
-          <a:p>
-            <a:pPr lvl="2"/>
-            <a:r>
-              <a:t>To drink water, dig a well.</a:t>
-            </a:r>
-          </a:p>
-          <a:p>
-            <a:pPr lvl="3"/>
-            <a:r>
-              <a:t>First time very costly, subsequently minimal cost</a:t>
-            </a:r>
-          </a:p>
-          <a:p>
-            <a:pPr lvl="2"/>
-            <a:r>
-              <a:t>Giving a lecture first time on new topic</a:t>
-            </a:r>
-          </a:p>
-          <a:p>
-            <a:pPr lvl="3"/>
-            <a:r>
-              <a:t>Subsequent lectures on same topic much easier</a:t>
-            </a:r>
-          </a:p>
-          <a:p>
-            <a:pPr/>
-            <a:r>
-              <a:t>Thus, amortise the cost over n operations</a:t>
-            </a:r>
-          </a:p>
-        </p:txBody>
-      </p:sp>
-      <p:sp>
-        <p:nvSpPr>
-          <p:cNvPr id="118" name="Slide Number"/>
+          <p:cNvPr id="117" name="Slide Number"/>
           <p:cNvSpPr txBox="1"/>
           <p:nvPr>
             <p:ph type="sldNum" sz="quarter" idx="2"/>
@@ -7207,7 +7137,7 @@
       </p:sp>
       <p:sp>
         <p:nvSpPr>
-          <p:cNvPr id="119" name="DAA/Analysis Framework"/>
+          <p:cNvPr id="118" name="DAA/Analysis Framework"/>
           <p:cNvSpPr txBox="1"/>
           <p:nvPr/>
         </p:nvSpPr>
@@ -7247,7 +7177,7 @@
       </p:sp>
       <p:sp>
         <p:nvSpPr>
-          <p:cNvPr id="120" name="RPR/"/>
+          <p:cNvPr id="119" name="RPR/"/>
           <p:cNvSpPr txBox="1"/>
           <p:nvPr/>
         </p:nvSpPr>
@@ -7285,611 +7215,9 @@
           </a:p>
         </p:txBody>
       </p:sp>
-    </p:spTree>
-  </p:cSld>
-  <p:clrMapOvr>
-    <a:masterClrMapping/>
-  </p:clrMapOvr>
-  <p:transition xmlns:p14="http://schemas.microsoft.com/office/powerpoint/2010/main" spd="med" advClick="1"/>
-  <p:timing>
-    <p:tnLst>
-      <p:par>
-        <p:cTn id="1" nodeType="tmRoot" restart="never" dur="indefinite" fill="hold">
-          <p:childTnLst>
-            <p:seq concurrent="1" prevAc="none" nextAc="seek">
-              <p:cTn id="2" nodeType="mainSeq" dur="indefinite" fill="hold">
-                <p:childTnLst>
-                  <p:par>
-                    <p:cTn id="3" fill="hold">
-                      <p:stCondLst>
-                        <p:cond delay="indefinite"/>
-                      </p:stCondLst>
-                      <p:childTnLst>
-                        <p:par>
-                          <p:cTn id="4" fill="hold">
-                            <p:stCondLst>
-                              <p:cond delay="0"/>
-                            </p:stCondLst>
-                            <p:childTnLst>
-                              <p:par>
-                                <p:cTn id="5" presetClass="entr" nodeType="clickEffect" presetSubtype="0" presetID="1" grpId="1" fill="hold">
-                                  <p:stCondLst>
-                                    <p:cond delay="0"/>
-                                  </p:stCondLst>
-                                  <p:iterate type="el" backwards="0">
-                                    <p:tmAbs val="0"/>
-                                  </p:iterate>
-                                  <p:childTnLst>
-                                    <p:set>
-                                      <p:cBhvr>
-                                        <p:cTn id="6" fill="hold"/>
-                                        <p:tgtEl>
-                                          <p:spTgt spid="117">
-                                            <p:bg/>
-                                          </p:spTgt>
-                                        </p:tgtEl>
-                                        <p:attrNameLst>
-                                          <p:attrName>style.visibility</p:attrName>
-                                        </p:attrNameLst>
-                                      </p:cBhvr>
-                                      <p:to>
-                                        <p:strVal val="visible"/>
-                                      </p:to>
-                                    </p:set>
-                                  </p:childTnLst>
-                                </p:cTn>
-                              </p:par>
-                              <p:par>
-                                <p:cTn id="7" presetClass="entr" nodeType="withEffect" presetSubtype="0" presetID="1" grpId="1" fill="hold">
-                                  <p:stCondLst>
-                                    <p:cond delay="0"/>
-                                  </p:stCondLst>
-                                  <p:iterate type="el" backwards="0">
-                                    <p:tmAbs val="0"/>
-                                  </p:iterate>
-                                  <p:childTnLst>
-                                    <p:set>
-                                      <p:cBhvr>
-                                        <p:cTn id="8" fill="hold"/>
-                                        <p:tgtEl>
-                                          <p:spTgt spid="117">
-                                            <p:txEl>
-                                              <p:pRg st="0" end="0"/>
-                                            </p:txEl>
-                                          </p:spTgt>
-                                        </p:tgtEl>
-                                        <p:attrNameLst>
-                                          <p:attrName>style.visibility</p:attrName>
-                                        </p:attrNameLst>
-                                      </p:cBhvr>
-                                      <p:to>
-                                        <p:strVal val="visible"/>
-                                      </p:to>
-                                    </p:set>
-                                  </p:childTnLst>
-                                </p:cTn>
-                              </p:par>
-                            </p:childTnLst>
-                          </p:cTn>
-                        </p:par>
-                      </p:childTnLst>
-                    </p:cTn>
-                  </p:par>
-                  <p:par>
-                    <p:cTn id="9" fill="hold">
-                      <p:stCondLst>
-                        <p:cond delay="indefinite"/>
-                      </p:stCondLst>
-                      <p:childTnLst>
-                        <p:par>
-                          <p:cTn id="10" fill="hold">
-                            <p:stCondLst>
-                              <p:cond delay="0"/>
-                            </p:stCondLst>
-                            <p:childTnLst>
-                              <p:par>
-                                <p:cTn id="11" presetClass="entr" nodeType="clickEffect" presetSubtype="0" presetID="1" grpId="1" fill="hold">
-                                  <p:stCondLst>
-                                    <p:cond delay="0"/>
-                                  </p:stCondLst>
-                                  <p:iterate type="el" backwards="0">
-                                    <p:tmAbs val="0"/>
-                                  </p:iterate>
-                                  <p:childTnLst>
-                                    <p:set>
-                                      <p:cBhvr>
-                                        <p:cTn id="12" fill="hold"/>
-                                        <p:tgtEl>
-                                          <p:spTgt spid="117">
-                                            <p:txEl>
-                                              <p:pRg st="1" end="1"/>
-                                            </p:txEl>
-                                          </p:spTgt>
-                                        </p:tgtEl>
-                                        <p:attrNameLst>
-                                          <p:attrName>style.visibility</p:attrName>
-                                        </p:attrNameLst>
-                                      </p:cBhvr>
-                                      <p:to>
-                                        <p:strVal val="visible"/>
-                                      </p:to>
-                                    </p:set>
-                                  </p:childTnLst>
-                                </p:cTn>
-                              </p:par>
-                            </p:childTnLst>
-                          </p:cTn>
-                        </p:par>
-                      </p:childTnLst>
-                    </p:cTn>
-                  </p:par>
-                  <p:par>
-                    <p:cTn id="13" fill="hold">
-                      <p:stCondLst>
-                        <p:cond delay="indefinite"/>
-                      </p:stCondLst>
-                      <p:childTnLst>
-                        <p:par>
-                          <p:cTn id="14" fill="hold">
-                            <p:stCondLst>
-                              <p:cond delay="0"/>
-                            </p:stCondLst>
-                            <p:childTnLst>
-                              <p:par>
-                                <p:cTn id="15" presetClass="entr" nodeType="clickEffect" presetSubtype="0" presetID="1" grpId="1" fill="hold">
-                                  <p:stCondLst>
-                                    <p:cond delay="0"/>
-                                  </p:stCondLst>
-                                  <p:iterate type="el" backwards="0">
-                                    <p:tmAbs val="0"/>
-                                  </p:iterate>
-                                  <p:childTnLst>
-                                    <p:set>
-                                      <p:cBhvr>
-                                        <p:cTn id="16" fill="hold"/>
-                                        <p:tgtEl>
-                                          <p:spTgt spid="117">
-                                            <p:txEl>
-                                              <p:pRg st="2" end="2"/>
-                                            </p:txEl>
-                                          </p:spTgt>
-                                        </p:tgtEl>
-                                        <p:attrNameLst>
-                                          <p:attrName>style.visibility</p:attrName>
-                                        </p:attrNameLst>
-                                      </p:cBhvr>
-                                      <p:to>
-                                        <p:strVal val="visible"/>
-                                      </p:to>
-                                    </p:set>
-                                  </p:childTnLst>
-                                </p:cTn>
-                              </p:par>
-                            </p:childTnLst>
-                          </p:cTn>
-                        </p:par>
-                      </p:childTnLst>
-                    </p:cTn>
-                  </p:par>
-                  <p:par>
-                    <p:cTn id="17" fill="hold">
-                      <p:stCondLst>
-                        <p:cond delay="indefinite"/>
-                      </p:stCondLst>
-                      <p:childTnLst>
-                        <p:par>
-                          <p:cTn id="18" fill="hold">
-                            <p:stCondLst>
-                              <p:cond delay="0"/>
-                            </p:stCondLst>
-                            <p:childTnLst>
-                              <p:par>
-                                <p:cTn id="19" presetClass="entr" nodeType="clickEffect" presetSubtype="0" presetID="1" grpId="1" fill="hold">
-                                  <p:stCondLst>
-                                    <p:cond delay="0"/>
-                                  </p:stCondLst>
-                                  <p:iterate type="el" backwards="0">
-                                    <p:tmAbs val="0"/>
-                                  </p:iterate>
-                                  <p:childTnLst>
-                                    <p:set>
-                                      <p:cBhvr>
-                                        <p:cTn id="20" fill="hold"/>
-                                        <p:tgtEl>
-                                          <p:spTgt spid="117">
-                                            <p:txEl>
-                                              <p:pRg st="3" end="3"/>
-                                            </p:txEl>
-                                          </p:spTgt>
-                                        </p:tgtEl>
-                                        <p:attrNameLst>
-                                          <p:attrName>style.visibility</p:attrName>
-                                        </p:attrNameLst>
-                                      </p:cBhvr>
-                                      <p:to>
-                                        <p:strVal val="visible"/>
-                                      </p:to>
-                                    </p:set>
-                                  </p:childTnLst>
-                                </p:cTn>
-                              </p:par>
-                            </p:childTnLst>
-                          </p:cTn>
-                        </p:par>
-                      </p:childTnLst>
-                    </p:cTn>
-                  </p:par>
-                  <p:par>
-                    <p:cTn id="21" fill="hold">
-                      <p:stCondLst>
-                        <p:cond delay="indefinite"/>
-                      </p:stCondLst>
-                      <p:childTnLst>
-                        <p:par>
-                          <p:cTn id="22" fill="hold">
-                            <p:stCondLst>
-                              <p:cond delay="0"/>
-                            </p:stCondLst>
-                            <p:childTnLst>
-                              <p:par>
-                                <p:cTn id="23" presetClass="entr" nodeType="clickEffect" presetSubtype="0" presetID="1" grpId="1" fill="hold">
-                                  <p:stCondLst>
-                                    <p:cond delay="0"/>
-                                  </p:stCondLst>
-                                  <p:iterate type="el" backwards="0">
-                                    <p:tmAbs val="0"/>
-                                  </p:iterate>
-                                  <p:childTnLst>
-                                    <p:set>
-                                      <p:cBhvr>
-                                        <p:cTn id="24" fill="hold"/>
-                                        <p:tgtEl>
-                                          <p:spTgt spid="117">
-                                            <p:txEl>
-                                              <p:pRg st="4" end="4"/>
-                                            </p:txEl>
-                                          </p:spTgt>
-                                        </p:tgtEl>
-                                        <p:attrNameLst>
-                                          <p:attrName>style.visibility</p:attrName>
-                                        </p:attrNameLst>
-                                      </p:cBhvr>
-                                      <p:to>
-                                        <p:strVal val="visible"/>
-                                      </p:to>
-                                    </p:set>
-                                  </p:childTnLst>
-                                </p:cTn>
-                              </p:par>
-                            </p:childTnLst>
-                          </p:cTn>
-                        </p:par>
-                      </p:childTnLst>
-                    </p:cTn>
-                  </p:par>
-                  <p:par>
-                    <p:cTn id="25" fill="hold">
-                      <p:stCondLst>
-                        <p:cond delay="indefinite"/>
-                      </p:stCondLst>
-                      <p:childTnLst>
-                        <p:par>
-                          <p:cTn id="26" fill="hold">
-                            <p:stCondLst>
-                              <p:cond delay="0"/>
-                            </p:stCondLst>
-                            <p:childTnLst>
-                              <p:par>
-                                <p:cTn id="27" presetClass="entr" nodeType="clickEffect" presetSubtype="0" presetID="1" grpId="1" fill="hold">
-                                  <p:stCondLst>
-                                    <p:cond delay="0"/>
-                                  </p:stCondLst>
-                                  <p:iterate type="el" backwards="0">
-                                    <p:tmAbs val="0"/>
-                                  </p:iterate>
-                                  <p:childTnLst>
-                                    <p:set>
-                                      <p:cBhvr>
-                                        <p:cTn id="28" fill="hold"/>
-                                        <p:tgtEl>
-                                          <p:spTgt spid="117">
-                                            <p:txEl>
-                                              <p:pRg st="5" end="5"/>
-                                            </p:txEl>
-                                          </p:spTgt>
-                                        </p:tgtEl>
-                                        <p:attrNameLst>
-                                          <p:attrName>style.visibility</p:attrName>
-                                        </p:attrNameLst>
-                                      </p:cBhvr>
-                                      <p:to>
-                                        <p:strVal val="visible"/>
-                                      </p:to>
-                                    </p:set>
-                                  </p:childTnLst>
-                                </p:cTn>
-                              </p:par>
-                            </p:childTnLst>
-                          </p:cTn>
-                        </p:par>
-                      </p:childTnLst>
-                    </p:cTn>
-                  </p:par>
-                  <p:par>
-                    <p:cTn id="29" fill="hold">
-                      <p:stCondLst>
-                        <p:cond delay="indefinite"/>
-                      </p:stCondLst>
-                      <p:childTnLst>
-                        <p:par>
-                          <p:cTn id="30" fill="hold">
-                            <p:stCondLst>
-                              <p:cond delay="0"/>
-                            </p:stCondLst>
-                            <p:childTnLst>
-                              <p:par>
-                                <p:cTn id="31" presetClass="entr" nodeType="clickEffect" presetSubtype="0" presetID="1" grpId="1" fill="hold">
-                                  <p:stCondLst>
-                                    <p:cond delay="0"/>
-                                  </p:stCondLst>
-                                  <p:iterate type="el" backwards="0">
-                                    <p:tmAbs val="0"/>
-                                  </p:iterate>
-                                  <p:childTnLst>
-                                    <p:set>
-                                      <p:cBhvr>
-                                        <p:cTn id="32" fill="hold"/>
-                                        <p:tgtEl>
-                                          <p:spTgt spid="117">
-                                            <p:txEl>
-                                              <p:pRg st="6" end="6"/>
-                                            </p:txEl>
-                                          </p:spTgt>
-                                        </p:tgtEl>
-                                        <p:attrNameLst>
-                                          <p:attrName>style.visibility</p:attrName>
-                                        </p:attrNameLst>
-                                      </p:cBhvr>
-                                      <p:to>
-                                        <p:strVal val="visible"/>
-                                      </p:to>
-                                    </p:set>
-                                  </p:childTnLst>
-                                </p:cTn>
-                              </p:par>
-                            </p:childTnLst>
-                          </p:cTn>
-                        </p:par>
-                      </p:childTnLst>
-                    </p:cTn>
-                  </p:par>
-                  <p:par>
-                    <p:cTn id="33" fill="hold">
-                      <p:stCondLst>
-                        <p:cond delay="indefinite"/>
-                      </p:stCondLst>
-                      <p:childTnLst>
-                        <p:par>
-                          <p:cTn id="34" fill="hold">
-                            <p:stCondLst>
-                              <p:cond delay="0"/>
-                            </p:stCondLst>
-                            <p:childTnLst>
-                              <p:par>
-                                <p:cTn id="35" presetClass="entr" nodeType="clickEffect" presetSubtype="0" presetID="1" grpId="1" fill="hold">
-                                  <p:stCondLst>
-                                    <p:cond delay="0"/>
-                                  </p:stCondLst>
-                                  <p:iterate type="el" backwards="0">
-                                    <p:tmAbs val="0"/>
-                                  </p:iterate>
-                                  <p:childTnLst>
-                                    <p:set>
-                                      <p:cBhvr>
-                                        <p:cTn id="36" fill="hold"/>
-                                        <p:tgtEl>
-                                          <p:spTgt spid="117">
-                                            <p:txEl>
-                                              <p:pRg st="7" end="7"/>
-                                            </p:txEl>
-                                          </p:spTgt>
-                                        </p:tgtEl>
-                                        <p:attrNameLst>
-                                          <p:attrName>style.visibility</p:attrName>
-                                        </p:attrNameLst>
-                                      </p:cBhvr>
-                                      <p:to>
-                                        <p:strVal val="visible"/>
-                                      </p:to>
-                                    </p:set>
-                                  </p:childTnLst>
-                                </p:cTn>
-                              </p:par>
-                            </p:childTnLst>
-                          </p:cTn>
-                        </p:par>
-                      </p:childTnLst>
-                    </p:cTn>
-                  </p:par>
-                </p:childTnLst>
-              </p:cTn>
-              <p:prevCondLst>
-                <p:cond evt="onPrev">
-                  <p:tgtEl>
-                    <p:sldTgt/>
-                  </p:tgtEl>
-                </p:cond>
-              </p:prevCondLst>
-              <p:nextCondLst>
-                <p:cond evt="onNext">
-                  <p:tgtEl>
-                    <p:sldTgt/>
-                  </p:tgtEl>
-                </p:cond>
-              </p:nextCondLst>
-            </p:seq>
-          </p:childTnLst>
-        </p:cTn>
-      </p:par>
-    </p:tnLst>
-    <p:bldLst>
-      <p:bldP build="p" bldLvl="5" animBg="1" rev="0" advAuto="0" spid="117" grpId="1"/>
-    </p:bldLst>
-  </p:timing>
-</p:sld>
-</file>
-
-<file path=ppt/slides/slide16.xml><?xml version="1.0" encoding="utf-8"?>
-<p:sld xmlns:a="http://schemas.openxmlformats.org/drawingml/2006/main" xmlns:r="http://schemas.openxmlformats.org/officeDocument/2006/relationships" xmlns:p="http://schemas.openxmlformats.org/presentationml/2006/main" xmlns:m="http://schemas.openxmlformats.org/officeDocument/2006/math" xmlns:a14="http://schemas.microsoft.com/office/drawing/2010/main" showMasterSp="1" showMasterPhAnim="1">
-  <p:cSld>
-    <p:spTree>
-      <p:nvGrpSpPr>
-        <p:cNvPr id="1" name=""/>
-        <p:cNvGrpSpPr/>
-        <p:nvPr/>
-      </p:nvGrpSpPr>
-      <p:grpSpPr>
-        <a:xfrm>
-          <a:off x="0" y="0"/>
-          <a:ext cx="0" cy="0"/>
-          <a:chOff x="0" y="0"/>
-          <a:chExt cx="0" cy="0"/>
-        </a:xfrm>
-      </p:grpSpPr>
-      <p:sp>
-        <p:nvSpPr>
-          <p:cNvPr id="122" name="Order of Growth"/>
-          <p:cNvSpPr txBox="1"/>
-          <p:nvPr>
-            <p:ph type="title"/>
-          </p:nvPr>
-        </p:nvSpPr>
-        <p:spPr>
-          <a:prstGeom prst="rect">
-            <a:avLst/>
-          </a:prstGeom>
-        </p:spPr>
-        <p:txBody>
-          <a:bodyPr/>
-          <a:lstStyle/>
-          <a:p>
-            <a:pPr/>
-            <a:r>
-              <a:t>Order of Growth</a:t>
-            </a:r>
-          </a:p>
-        </p:txBody>
-      </p:sp>
-      <p:sp>
-        <p:nvSpPr>
-          <p:cNvPr id="123" name="Slide Number"/>
-          <p:cNvSpPr txBox="1"/>
-          <p:nvPr>
-            <p:ph type="sldNum" sz="quarter" idx="2"/>
-          </p:nvPr>
-        </p:nvSpPr>
-        <p:spPr>
-          <a:prstGeom prst="rect">
-            <a:avLst/>
-          </a:prstGeom>
-          <a:extLst>
-            <a:ext uri="{C572A759-6A51-4108-AA02-DFA0A04FC94B}">
-              <ma14:wrappingTextBoxFlag xmlns:ma14="http://schemas.microsoft.com/office/mac/drawingml/2011/main" val="1"/>
-            </a:ext>
-          </a:extLst>
-        </p:spPr>
-        <p:txBody>
-          <a:bodyPr/>
-          <a:lstStyle/>
-          <a:p>
-            <a:pPr/>
-            <a:fld id="{86CB4B4D-7CA3-9044-876B-883B54F8677D}" type="slidenum"/>
-          </a:p>
-        </p:txBody>
-      </p:sp>
-      <p:sp>
-        <p:nvSpPr>
-          <p:cNvPr id="124" name="DAA/Analysis Framework"/>
-          <p:cNvSpPr txBox="1"/>
-          <p:nvPr/>
-        </p:nvSpPr>
-        <p:spPr>
-          <a:xfrm>
-            <a:off x="423212" y="6963885"/>
-            <a:ext cx="3448061" cy="431552"/>
-          </a:xfrm>
-          <a:prstGeom prst="rect">
-            <a:avLst/>
-          </a:prstGeom>
-          <a:ln w="12700">
-            <a:miter lim="400000"/>
-          </a:ln>
-          <a:extLst>
-            <a:ext uri="{C572A759-6A51-4108-AA02-DFA0A04FC94B}">
-              <ma14:wrappingTextBoxFlag xmlns:ma14="http://schemas.microsoft.com/office/mac/drawingml/2011/main" val="1"/>
-            </a:ext>
-          </a:extLst>
-        </p:spPr>
-        <p:txBody>
-          <a:bodyPr wrap="none" lIns="50800" tIns="50800" rIns="50800" bIns="50800" anchor="ctr">
-            <a:spAutoFit/>
-          </a:bodyPr>
-          <a:lstStyle>
-            <a:lvl1pPr>
-              <a:defRPr sz="2400"/>
-            </a:lvl1pPr>
-          </a:lstStyle>
-          <a:p>
-            <a:pPr/>
-            <a:r>
-              <a:t>DAA/Analysis Framework</a:t>
-            </a:r>
-          </a:p>
-        </p:txBody>
-      </p:sp>
-      <p:sp>
-        <p:nvSpPr>
-          <p:cNvPr id="125" name="RPR/"/>
-          <p:cNvSpPr txBox="1"/>
-          <p:nvPr/>
-        </p:nvSpPr>
-        <p:spPr>
-          <a:xfrm>
-            <a:off x="7535212" y="6988206"/>
-            <a:ext cx="705605" cy="382910"/>
-          </a:xfrm>
-          <a:prstGeom prst="rect">
-            <a:avLst/>
-          </a:prstGeom>
-          <a:ln w="12700">
-            <a:miter lim="400000"/>
-          </a:ln>
-          <a:extLst>
-            <a:ext uri="{C572A759-6A51-4108-AA02-DFA0A04FC94B}">
-              <ma14:wrappingTextBoxFlag xmlns:ma14="http://schemas.microsoft.com/office/mac/drawingml/2011/main" val="1"/>
-            </a:ext>
-          </a:extLst>
-        </p:spPr>
-        <p:txBody>
-          <a:bodyPr wrap="none" lIns="50800" tIns="50800" rIns="50800" bIns="50800" anchor="ctr">
-            <a:spAutoFit/>
-          </a:bodyPr>
-          <a:lstStyle>
-            <a:lvl1pPr>
-              <a:defRPr sz="2000"/>
-            </a:lvl1pPr>
-          </a:lstStyle>
-          <a:p>
-            <a:pPr/>
-            <a:r>
-              <a:t>RPR/</a:t>
-            </a:r>
-          </a:p>
-        </p:txBody>
-      </p:sp>
       <p:graphicFrame>
         <p:nvGraphicFramePr>
-          <p:cNvPr id="126" name="Table"/>
+          <p:cNvPr id="120" name="Table"/>
           <p:cNvGraphicFramePr/>
           <p:nvPr/>
         </p:nvGraphicFramePr>
@@ -9940,7 +9268,7 @@
                                       <p:cBhvr>
                                         <p:cTn id="6" fill="hold"/>
                                         <p:tgtEl>
-                                          <p:spTgt spid="126"/>
+                                          <p:spTgt spid="120"/>
                                         </p:tgtEl>
                                         <p:attrNameLst>
                                           <p:attrName>style.visibility</p:attrName>
@@ -9981,7 +9309,691 @@
       </p:par>
     </p:tnLst>
     <p:bldLst>
-      <p:bldP build="whole" bldLvl="1" animBg="1" rev="0" advAuto="0" spid="126" grpId="1"/>
+      <p:bldP build="whole" bldLvl="1" animBg="1" rev="0" advAuto="0" spid="120" grpId="1"/>
+    </p:bldLst>
+  </p:timing>
+</p:sld>
+</file>
+
+<file path=ppt/slides/slide16.xml><?xml version="1.0" encoding="utf-8"?>
+<p:sld xmlns:a="http://schemas.openxmlformats.org/drawingml/2006/main" xmlns:r="http://schemas.openxmlformats.org/officeDocument/2006/relationships" xmlns:p="http://schemas.openxmlformats.org/presentationml/2006/main" xmlns:m="http://schemas.openxmlformats.org/officeDocument/2006/math" xmlns:a14="http://schemas.microsoft.com/office/drawing/2010/main" showMasterSp="1" showMasterPhAnim="1">
+  <p:cSld>
+    <p:spTree>
+      <p:nvGrpSpPr>
+        <p:cNvPr id="1" name=""/>
+        <p:cNvGrpSpPr/>
+        <p:nvPr/>
+      </p:nvGrpSpPr>
+      <p:grpSpPr>
+        <a:xfrm>
+          <a:off x="0" y="0"/>
+          <a:ext cx="0" cy="0"/>
+          <a:chOff x="0" y="0"/>
+          <a:chExt cx="0" cy="0"/>
+        </a:xfrm>
+      </p:grpSpPr>
+      <p:sp>
+        <p:nvSpPr>
+          <p:cNvPr id="122" name="Amortised Efficiency"/>
+          <p:cNvSpPr txBox="1"/>
+          <p:nvPr>
+            <p:ph type="title"/>
+          </p:nvPr>
+        </p:nvSpPr>
+        <p:spPr>
+          <a:prstGeom prst="rect">
+            <a:avLst/>
+          </a:prstGeom>
+        </p:spPr>
+        <p:txBody>
+          <a:bodyPr/>
+          <a:lstStyle/>
+          <a:p>
+            <a:pPr/>
+            <a:r>
+              <a:t>Amortised Efficiency</a:t>
+            </a:r>
+          </a:p>
+        </p:txBody>
+      </p:sp>
+      <p:sp>
+        <p:nvSpPr>
+          <p:cNvPr id="123" name="So far, efficiency is related to a single run of algorithm.…"/>
+          <p:cNvSpPr txBox="1"/>
+          <p:nvPr>
+            <p:ph type="body" idx="1"/>
+          </p:nvPr>
+        </p:nvSpPr>
+        <p:spPr>
+          <a:xfrm>
+            <a:off x="887784" y="938113"/>
+            <a:ext cx="8915318" cy="5891610"/>
+          </a:xfrm>
+          <a:prstGeom prst="rect">
+            <a:avLst/>
+          </a:prstGeom>
+        </p:spPr>
+        <p:txBody>
+          <a:bodyPr/>
+          <a:lstStyle/>
+          <a:p>
+            <a:pPr/>
+            <a:r>
+              <a:t>So far, efficiency is related to a single run of algorithm.</a:t>
+            </a:r>
+          </a:p>
+          <a:p>
+            <a:pPr/>
+            <a:r>
+              <a:t>In some cases, single run can be very expensive, but subsequent run can be much cheaper</a:t>
+            </a:r>
+          </a:p>
+          <a:p>
+            <a:pPr lvl="1"/>
+            <a:r>
+              <a:t>Real life example: </a:t>
+            </a:r>
+          </a:p>
+          <a:p>
+            <a:pPr lvl="2"/>
+            <a:r>
+              <a:t>To drink water, dig a well.</a:t>
+            </a:r>
+          </a:p>
+          <a:p>
+            <a:pPr lvl="3"/>
+            <a:r>
+              <a:t>First time very costly, subsequently minimal cost</a:t>
+            </a:r>
+          </a:p>
+          <a:p>
+            <a:pPr lvl="2"/>
+            <a:r>
+              <a:t>Giving a lecture first time on new topic</a:t>
+            </a:r>
+          </a:p>
+          <a:p>
+            <a:pPr lvl="3"/>
+            <a:r>
+              <a:t>Subsequent lectures on same topic much easier</a:t>
+            </a:r>
+          </a:p>
+          <a:p>
+            <a:pPr/>
+            <a:r>
+              <a:t>Thus, amortise the cost over </a:t>
+            </a:r>
+            <a:r>
+              <a:rPr>
+                <a:latin typeface="Courier New"/>
+                <a:ea typeface="Courier New"/>
+                <a:cs typeface="Courier New"/>
+                <a:sym typeface="Courier New"/>
+              </a:rPr>
+              <a:t>n</a:t>
+            </a:r>
+            <a:r>
+              <a:t> operations</a:t>
+            </a:r>
+          </a:p>
+        </p:txBody>
+      </p:sp>
+      <p:sp>
+        <p:nvSpPr>
+          <p:cNvPr id="124" name="Slide Number"/>
+          <p:cNvSpPr txBox="1"/>
+          <p:nvPr>
+            <p:ph type="sldNum" sz="quarter" idx="2"/>
+          </p:nvPr>
+        </p:nvSpPr>
+        <p:spPr>
+          <a:prstGeom prst="rect">
+            <a:avLst/>
+          </a:prstGeom>
+          <a:extLst>
+            <a:ext uri="{C572A759-6A51-4108-AA02-DFA0A04FC94B}">
+              <ma14:wrappingTextBoxFlag xmlns:ma14="http://schemas.microsoft.com/office/mac/drawingml/2011/main" val="1"/>
+            </a:ext>
+          </a:extLst>
+        </p:spPr>
+        <p:txBody>
+          <a:bodyPr/>
+          <a:lstStyle/>
+          <a:p>
+            <a:pPr/>
+            <a:fld id="{86CB4B4D-7CA3-9044-876B-883B54F8677D}" type="slidenum"/>
+          </a:p>
+        </p:txBody>
+      </p:sp>
+      <p:sp>
+        <p:nvSpPr>
+          <p:cNvPr id="125" name="DAA/Analysis Framework"/>
+          <p:cNvSpPr txBox="1"/>
+          <p:nvPr/>
+        </p:nvSpPr>
+        <p:spPr>
+          <a:xfrm>
+            <a:off x="423212" y="6963885"/>
+            <a:ext cx="3448061" cy="431552"/>
+          </a:xfrm>
+          <a:prstGeom prst="rect">
+            <a:avLst/>
+          </a:prstGeom>
+          <a:ln w="12700">
+            <a:miter lim="400000"/>
+          </a:ln>
+          <a:extLst>
+            <a:ext uri="{C572A759-6A51-4108-AA02-DFA0A04FC94B}">
+              <ma14:wrappingTextBoxFlag xmlns:ma14="http://schemas.microsoft.com/office/mac/drawingml/2011/main" val="1"/>
+            </a:ext>
+          </a:extLst>
+        </p:spPr>
+        <p:txBody>
+          <a:bodyPr wrap="none" lIns="50800" tIns="50800" rIns="50800" bIns="50800" anchor="ctr">
+            <a:spAutoFit/>
+          </a:bodyPr>
+          <a:lstStyle>
+            <a:lvl1pPr>
+              <a:defRPr sz="2400"/>
+            </a:lvl1pPr>
+          </a:lstStyle>
+          <a:p>
+            <a:pPr/>
+            <a:r>
+              <a:t>DAA/Analysis Framework</a:t>
+            </a:r>
+          </a:p>
+        </p:txBody>
+      </p:sp>
+      <p:sp>
+        <p:nvSpPr>
+          <p:cNvPr id="126" name="RPR/"/>
+          <p:cNvSpPr txBox="1"/>
+          <p:nvPr/>
+        </p:nvSpPr>
+        <p:spPr>
+          <a:xfrm>
+            <a:off x="7535212" y="6988206"/>
+            <a:ext cx="705605" cy="382910"/>
+          </a:xfrm>
+          <a:prstGeom prst="rect">
+            <a:avLst/>
+          </a:prstGeom>
+          <a:ln w="12700">
+            <a:miter lim="400000"/>
+          </a:ln>
+          <a:extLst>
+            <a:ext uri="{C572A759-6A51-4108-AA02-DFA0A04FC94B}">
+              <ma14:wrappingTextBoxFlag xmlns:ma14="http://schemas.microsoft.com/office/mac/drawingml/2011/main" val="1"/>
+            </a:ext>
+          </a:extLst>
+        </p:spPr>
+        <p:txBody>
+          <a:bodyPr wrap="none" lIns="50800" tIns="50800" rIns="50800" bIns="50800" anchor="ctr">
+            <a:spAutoFit/>
+          </a:bodyPr>
+          <a:lstStyle>
+            <a:lvl1pPr>
+              <a:defRPr sz="2000"/>
+            </a:lvl1pPr>
+          </a:lstStyle>
+          <a:p>
+            <a:pPr/>
+            <a:r>
+              <a:t>RPR/</a:t>
+            </a:r>
+          </a:p>
+        </p:txBody>
+      </p:sp>
+    </p:spTree>
+  </p:cSld>
+  <p:clrMapOvr>
+    <a:masterClrMapping/>
+  </p:clrMapOvr>
+  <p:transition xmlns:p14="http://schemas.microsoft.com/office/powerpoint/2010/main" spd="med" advClick="1"/>
+  <p:timing>
+    <p:tnLst>
+      <p:par>
+        <p:cTn id="1" nodeType="tmRoot" restart="never" dur="indefinite" fill="hold">
+          <p:childTnLst>
+            <p:seq concurrent="1" prevAc="none" nextAc="seek">
+              <p:cTn id="2" nodeType="mainSeq" dur="indefinite" fill="hold">
+                <p:childTnLst>
+                  <p:par>
+                    <p:cTn id="3" fill="hold">
+                      <p:stCondLst>
+                        <p:cond delay="indefinite"/>
+                      </p:stCondLst>
+                      <p:childTnLst>
+                        <p:par>
+                          <p:cTn id="4" fill="hold">
+                            <p:stCondLst>
+                              <p:cond delay="0"/>
+                            </p:stCondLst>
+                            <p:childTnLst>
+                              <p:par>
+                                <p:cTn id="5" presetClass="entr" nodeType="clickEffect" presetSubtype="0" presetID="1" grpId="1" fill="hold">
+                                  <p:stCondLst>
+                                    <p:cond delay="0"/>
+                                  </p:stCondLst>
+                                  <p:iterate type="el" backwards="0">
+                                    <p:tmAbs val="0"/>
+                                  </p:iterate>
+                                  <p:childTnLst>
+                                    <p:set>
+                                      <p:cBhvr>
+                                        <p:cTn id="6" fill="hold"/>
+                                        <p:tgtEl>
+                                          <p:spTgt spid="123">
+                                            <p:bg/>
+                                          </p:spTgt>
+                                        </p:tgtEl>
+                                        <p:attrNameLst>
+                                          <p:attrName>style.visibility</p:attrName>
+                                        </p:attrNameLst>
+                                      </p:cBhvr>
+                                      <p:to>
+                                        <p:strVal val="visible"/>
+                                      </p:to>
+                                    </p:set>
+                                  </p:childTnLst>
+                                </p:cTn>
+                              </p:par>
+                              <p:par>
+                                <p:cTn id="7" presetClass="entr" nodeType="withEffect" presetSubtype="0" presetID="1" grpId="1" fill="hold">
+                                  <p:stCondLst>
+                                    <p:cond delay="0"/>
+                                  </p:stCondLst>
+                                  <p:iterate type="el" backwards="0">
+                                    <p:tmAbs val="0"/>
+                                  </p:iterate>
+                                  <p:childTnLst>
+                                    <p:set>
+                                      <p:cBhvr>
+                                        <p:cTn id="8" fill="hold"/>
+                                        <p:tgtEl>
+                                          <p:spTgt spid="123">
+                                            <p:txEl>
+                                              <p:pRg st="0" end="0"/>
+                                            </p:txEl>
+                                          </p:spTgt>
+                                        </p:tgtEl>
+                                        <p:attrNameLst>
+                                          <p:attrName>style.visibility</p:attrName>
+                                        </p:attrNameLst>
+                                      </p:cBhvr>
+                                      <p:to>
+                                        <p:strVal val="visible"/>
+                                      </p:to>
+                                    </p:set>
+                                  </p:childTnLst>
+                                </p:cTn>
+                              </p:par>
+                            </p:childTnLst>
+                          </p:cTn>
+                        </p:par>
+                      </p:childTnLst>
+                    </p:cTn>
+                  </p:par>
+                  <p:par>
+                    <p:cTn id="9" fill="hold">
+                      <p:stCondLst>
+                        <p:cond delay="indefinite"/>
+                      </p:stCondLst>
+                      <p:childTnLst>
+                        <p:par>
+                          <p:cTn id="10" fill="hold">
+                            <p:stCondLst>
+                              <p:cond delay="0"/>
+                            </p:stCondLst>
+                            <p:childTnLst>
+                              <p:par>
+                                <p:cTn id="11" presetClass="entr" nodeType="clickEffect" presetSubtype="0" presetID="1" grpId="1" fill="hold">
+                                  <p:stCondLst>
+                                    <p:cond delay="0"/>
+                                  </p:stCondLst>
+                                  <p:iterate type="el" backwards="0">
+                                    <p:tmAbs val="0"/>
+                                  </p:iterate>
+                                  <p:childTnLst>
+                                    <p:set>
+                                      <p:cBhvr>
+                                        <p:cTn id="12" fill="hold"/>
+                                        <p:tgtEl>
+                                          <p:spTgt spid="123">
+                                            <p:txEl>
+                                              <p:pRg st="1" end="1"/>
+                                            </p:txEl>
+                                          </p:spTgt>
+                                        </p:tgtEl>
+                                        <p:attrNameLst>
+                                          <p:attrName>style.visibility</p:attrName>
+                                        </p:attrNameLst>
+                                      </p:cBhvr>
+                                      <p:to>
+                                        <p:strVal val="visible"/>
+                                      </p:to>
+                                    </p:set>
+                                  </p:childTnLst>
+                                </p:cTn>
+                              </p:par>
+                            </p:childTnLst>
+                          </p:cTn>
+                        </p:par>
+                      </p:childTnLst>
+                    </p:cTn>
+                  </p:par>
+                  <p:par>
+                    <p:cTn id="13" fill="hold">
+                      <p:stCondLst>
+                        <p:cond delay="indefinite"/>
+                      </p:stCondLst>
+                      <p:childTnLst>
+                        <p:par>
+                          <p:cTn id="14" fill="hold">
+                            <p:stCondLst>
+                              <p:cond delay="0"/>
+                            </p:stCondLst>
+                            <p:childTnLst>
+                              <p:par>
+                                <p:cTn id="15" presetClass="entr" nodeType="clickEffect" presetSubtype="0" presetID="1" grpId="1" fill="hold">
+                                  <p:stCondLst>
+                                    <p:cond delay="0"/>
+                                  </p:stCondLst>
+                                  <p:iterate type="el" backwards="0">
+                                    <p:tmAbs val="0"/>
+                                  </p:iterate>
+                                  <p:childTnLst>
+                                    <p:set>
+                                      <p:cBhvr>
+                                        <p:cTn id="16" fill="hold"/>
+                                        <p:tgtEl>
+                                          <p:spTgt spid="123">
+                                            <p:txEl>
+                                              <p:pRg st="2" end="2"/>
+                                            </p:txEl>
+                                          </p:spTgt>
+                                        </p:tgtEl>
+                                        <p:attrNameLst>
+                                          <p:attrName>style.visibility</p:attrName>
+                                        </p:attrNameLst>
+                                      </p:cBhvr>
+                                      <p:to>
+                                        <p:strVal val="visible"/>
+                                      </p:to>
+                                    </p:set>
+                                  </p:childTnLst>
+                                </p:cTn>
+                              </p:par>
+                            </p:childTnLst>
+                          </p:cTn>
+                        </p:par>
+                      </p:childTnLst>
+                    </p:cTn>
+                  </p:par>
+                  <p:par>
+                    <p:cTn id="17" fill="hold">
+                      <p:stCondLst>
+                        <p:cond delay="indefinite"/>
+                      </p:stCondLst>
+                      <p:childTnLst>
+                        <p:par>
+                          <p:cTn id="18" fill="hold">
+                            <p:stCondLst>
+                              <p:cond delay="0"/>
+                            </p:stCondLst>
+                            <p:childTnLst>
+                              <p:par>
+                                <p:cTn id="19" presetClass="entr" nodeType="clickEffect" presetSubtype="0" presetID="1" grpId="1" fill="hold">
+                                  <p:stCondLst>
+                                    <p:cond delay="0"/>
+                                  </p:stCondLst>
+                                  <p:iterate type="el" backwards="0">
+                                    <p:tmAbs val="0"/>
+                                  </p:iterate>
+                                  <p:childTnLst>
+                                    <p:set>
+                                      <p:cBhvr>
+                                        <p:cTn id="20" fill="hold"/>
+                                        <p:tgtEl>
+                                          <p:spTgt spid="123">
+                                            <p:txEl>
+                                              <p:pRg st="3" end="3"/>
+                                            </p:txEl>
+                                          </p:spTgt>
+                                        </p:tgtEl>
+                                        <p:attrNameLst>
+                                          <p:attrName>style.visibility</p:attrName>
+                                        </p:attrNameLst>
+                                      </p:cBhvr>
+                                      <p:to>
+                                        <p:strVal val="visible"/>
+                                      </p:to>
+                                    </p:set>
+                                  </p:childTnLst>
+                                </p:cTn>
+                              </p:par>
+                            </p:childTnLst>
+                          </p:cTn>
+                        </p:par>
+                      </p:childTnLst>
+                    </p:cTn>
+                  </p:par>
+                  <p:par>
+                    <p:cTn id="21" fill="hold">
+                      <p:stCondLst>
+                        <p:cond delay="indefinite"/>
+                      </p:stCondLst>
+                      <p:childTnLst>
+                        <p:par>
+                          <p:cTn id="22" fill="hold">
+                            <p:stCondLst>
+                              <p:cond delay="0"/>
+                            </p:stCondLst>
+                            <p:childTnLst>
+                              <p:par>
+                                <p:cTn id="23" presetClass="entr" nodeType="clickEffect" presetSubtype="0" presetID="1" grpId="1" fill="hold">
+                                  <p:stCondLst>
+                                    <p:cond delay="0"/>
+                                  </p:stCondLst>
+                                  <p:iterate type="el" backwards="0">
+                                    <p:tmAbs val="0"/>
+                                  </p:iterate>
+                                  <p:childTnLst>
+                                    <p:set>
+                                      <p:cBhvr>
+                                        <p:cTn id="24" fill="hold"/>
+                                        <p:tgtEl>
+                                          <p:spTgt spid="123">
+                                            <p:txEl>
+                                              <p:pRg st="4" end="4"/>
+                                            </p:txEl>
+                                          </p:spTgt>
+                                        </p:tgtEl>
+                                        <p:attrNameLst>
+                                          <p:attrName>style.visibility</p:attrName>
+                                        </p:attrNameLst>
+                                      </p:cBhvr>
+                                      <p:to>
+                                        <p:strVal val="visible"/>
+                                      </p:to>
+                                    </p:set>
+                                  </p:childTnLst>
+                                </p:cTn>
+                              </p:par>
+                            </p:childTnLst>
+                          </p:cTn>
+                        </p:par>
+                      </p:childTnLst>
+                    </p:cTn>
+                  </p:par>
+                  <p:par>
+                    <p:cTn id="25" fill="hold">
+                      <p:stCondLst>
+                        <p:cond delay="indefinite"/>
+                      </p:stCondLst>
+                      <p:childTnLst>
+                        <p:par>
+                          <p:cTn id="26" fill="hold">
+                            <p:stCondLst>
+                              <p:cond delay="0"/>
+                            </p:stCondLst>
+                            <p:childTnLst>
+                              <p:par>
+                                <p:cTn id="27" presetClass="entr" nodeType="clickEffect" presetSubtype="0" presetID="1" grpId="1" fill="hold">
+                                  <p:stCondLst>
+                                    <p:cond delay="0"/>
+                                  </p:stCondLst>
+                                  <p:iterate type="el" backwards="0">
+                                    <p:tmAbs val="0"/>
+                                  </p:iterate>
+                                  <p:childTnLst>
+                                    <p:set>
+                                      <p:cBhvr>
+                                        <p:cTn id="28" fill="hold"/>
+                                        <p:tgtEl>
+                                          <p:spTgt spid="123">
+                                            <p:txEl>
+                                              <p:pRg st="5" end="5"/>
+                                            </p:txEl>
+                                          </p:spTgt>
+                                        </p:tgtEl>
+                                        <p:attrNameLst>
+                                          <p:attrName>style.visibility</p:attrName>
+                                        </p:attrNameLst>
+                                      </p:cBhvr>
+                                      <p:to>
+                                        <p:strVal val="visible"/>
+                                      </p:to>
+                                    </p:set>
+                                  </p:childTnLst>
+                                </p:cTn>
+                              </p:par>
+                            </p:childTnLst>
+                          </p:cTn>
+                        </p:par>
+                      </p:childTnLst>
+                    </p:cTn>
+                  </p:par>
+                  <p:par>
+                    <p:cTn id="29" fill="hold">
+                      <p:stCondLst>
+                        <p:cond delay="indefinite"/>
+                      </p:stCondLst>
+                      <p:childTnLst>
+                        <p:par>
+                          <p:cTn id="30" fill="hold">
+                            <p:stCondLst>
+                              <p:cond delay="0"/>
+                            </p:stCondLst>
+                            <p:childTnLst>
+                              <p:par>
+                                <p:cTn id="31" presetClass="entr" nodeType="clickEffect" presetSubtype="0" presetID="1" grpId="1" fill="hold">
+                                  <p:stCondLst>
+                                    <p:cond delay="0"/>
+                                  </p:stCondLst>
+                                  <p:iterate type="el" backwards="0">
+                                    <p:tmAbs val="0"/>
+                                  </p:iterate>
+                                  <p:childTnLst>
+                                    <p:set>
+                                      <p:cBhvr>
+                                        <p:cTn id="32" fill="hold"/>
+                                        <p:tgtEl>
+                                          <p:spTgt spid="123">
+                                            <p:txEl>
+                                              <p:pRg st="6" end="6"/>
+                                            </p:txEl>
+                                          </p:spTgt>
+                                        </p:tgtEl>
+                                        <p:attrNameLst>
+                                          <p:attrName>style.visibility</p:attrName>
+                                        </p:attrNameLst>
+                                      </p:cBhvr>
+                                      <p:to>
+                                        <p:strVal val="visible"/>
+                                      </p:to>
+                                    </p:set>
+                                  </p:childTnLst>
+                                </p:cTn>
+                              </p:par>
+                            </p:childTnLst>
+                          </p:cTn>
+                        </p:par>
+                      </p:childTnLst>
+                    </p:cTn>
+                  </p:par>
+                  <p:par>
+                    <p:cTn id="33" fill="hold">
+                      <p:stCondLst>
+                        <p:cond delay="indefinite"/>
+                      </p:stCondLst>
+                      <p:childTnLst>
+                        <p:par>
+                          <p:cTn id="34" fill="hold">
+                            <p:stCondLst>
+                              <p:cond delay="0"/>
+                            </p:stCondLst>
+                            <p:childTnLst>
+                              <p:par>
+                                <p:cTn id="35" presetClass="entr" nodeType="clickEffect" presetSubtype="0" presetID="1" grpId="1" fill="hold">
+                                  <p:stCondLst>
+                                    <p:cond delay="0"/>
+                                  </p:stCondLst>
+                                  <p:iterate type="el" backwards="0">
+                                    <p:tmAbs val="0"/>
+                                  </p:iterate>
+                                  <p:childTnLst>
+                                    <p:set>
+                                      <p:cBhvr>
+                                        <p:cTn id="36" fill="hold"/>
+                                        <p:tgtEl>
+                                          <p:spTgt spid="123">
+                                            <p:txEl>
+                                              <p:pRg st="7" end="7"/>
+                                            </p:txEl>
+                                          </p:spTgt>
+                                        </p:tgtEl>
+                                        <p:attrNameLst>
+                                          <p:attrName>style.visibility</p:attrName>
+                                        </p:attrNameLst>
+                                      </p:cBhvr>
+                                      <p:to>
+                                        <p:strVal val="visible"/>
+                                      </p:to>
+                                    </p:set>
+                                  </p:childTnLst>
+                                </p:cTn>
+                              </p:par>
+                            </p:childTnLst>
+                          </p:cTn>
+                        </p:par>
+                      </p:childTnLst>
+                    </p:cTn>
+                  </p:par>
+                </p:childTnLst>
+              </p:cTn>
+              <p:prevCondLst>
+                <p:cond evt="onPrev">
+                  <p:tgtEl>
+                    <p:sldTgt/>
+                  </p:tgtEl>
+                </p:cond>
+              </p:prevCondLst>
+              <p:nextCondLst>
+                <p:cond evt="onNext">
+                  <p:tgtEl>
+                    <p:sldTgt/>
+                  </p:tgtEl>
+                </p:cond>
+              </p:nextCondLst>
+            </p:seq>
+          </p:childTnLst>
+        </p:cTn>
+      </p:par>
+    </p:tnLst>
+    <p:bldLst>
+      <p:bldP build="p" bldLvl="5" animBg="1" rev="0" advAuto="0" spid="123" grpId="1"/>
     </p:bldLst>
   </p:timing>
 </p:sld>
@@ -10818,6 +10830,9 @@
               </a:spcBef>
               <a:buChar char="•"/>
             </a:pPr>
+            <a:r>
+              <a:t>At least one matching pair? (worst case)</a:t>
+            </a:r>
           </a:p>
           <a:p>
             <a:pPr lvl="1" marL="738187" indent="-342900">
@@ -10827,7 +10842,7 @@
               <a:buChar char="•"/>
             </a:pPr>
             <a:r>
-              <a:t>At least one matching pair? (worst case)</a:t>
+              <a:t>At least one matching pair in the best case? </a:t>
             </a:r>
           </a:p>
           <a:p>
@@ -10836,9 +10851,18 @@
                 <a:spcPts val="700"/>
               </a:spcBef>
               <a:buChar char="•"/>
+              <a:defRPr sz="2800"/>
             </a:pPr>
             <a:r>
-              <a:t>At least one matching pair in the best case? </a:t>
+              <a:t>At least one matching pair of each color? (worse case)</a:t>
+            </a:r>
+          </a:p>
+          <a:p>
+            <a:pPr marL="382587" indent="-342899">
+              <a:defRPr sz="2800"/>
+            </a:pPr>
+            <a:r>
+              <a:t>Ans:</a:t>
             </a:r>
           </a:p>
           <a:p>
@@ -10847,9 +10871,52 @@
                 <a:spcPts val="700"/>
               </a:spcBef>
               <a:buChar char="•"/>
+              <a:defRPr sz="2800"/>
             </a:pPr>
             <a:r>
-              <a:t>At least one matching pair of each color? (worse case)</a:t>
+              <a:t>one matching pair: worst case: </a:t>
+            </a:r>
+            <a:r>
+              <a:rPr>
+                <a:latin typeface="Courier New"/>
+                <a:ea typeface="Courier New"/>
+                <a:cs typeface="Courier New"/>
+                <a:sym typeface="Courier New"/>
+              </a:rPr>
+              <a:t>12</a:t>
+            </a:r>
+            <a:r>
+              <a:t>, best case: </a:t>
+            </a:r>
+            <a:r>
+              <a:rPr>
+                <a:latin typeface="Courier New"/>
+                <a:ea typeface="Courier New"/>
+                <a:cs typeface="Courier New"/>
+                <a:sym typeface="Courier New"/>
+              </a:rPr>
+              <a:t>2</a:t>
+            </a:r>
+          </a:p>
+          <a:p>
+            <a:pPr lvl="1" marL="738187" indent="-342900">
+              <a:spcBef>
+                <a:spcPts val="700"/>
+              </a:spcBef>
+              <a:buChar char="•"/>
+              <a:defRPr sz="2800"/>
+            </a:pPr>
+            <a:r>
+              <a:t>one matching pair of each color: </a:t>
+            </a:r>
+            <a:r>
+              <a:rPr>
+                <a:latin typeface="Courier New"/>
+                <a:ea typeface="Courier New"/>
+                <a:cs typeface="Courier New"/>
+                <a:sym typeface="Courier New"/>
+              </a:rPr>
+              <a:t>21</a:t>
             </a:r>
           </a:p>
         </p:txBody>
@@ -11339,6 +11406,102 @@
                       </p:childTnLst>
                     </p:cTn>
                   </p:par>
+                  <p:par>
+                    <p:cTn id="33" fill="hold">
+                      <p:stCondLst>
+                        <p:cond delay="indefinite"/>
+                      </p:stCondLst>
+                      <p:childTnLst>
+                        <p:par>
+                          <p:cTn id="34" fill="hold">
+                            <p:stCondLst>
+                              <p:cond delay="0"/>
+                            </p:stCondLst>
+                            <p:childTnLst>
+                              <p:par>
+                                <p:cTn id="35" presetClass="entr" nodeType="clickEffect" presetSubtype="0" presetID="1" grpId="1" fill="hold">
+                                  <p:stCondLst>
+                                    <p:cond delay="0"/>
+                                  </p:stCondLst>
+                                  <p:iterate type="el" backwards="0">
+                                    <p:tmAbs val="0"/>
+                                  </p:iterate>
+                                  <p:childTnLst>
+                                    <p:set>
+                                      <p:cBhvr>
+                                        <p:cTn id="36" fill="hold"/>
+                                        <p:tgtEl>
+                                          <p:spTgt spid="135">
+                                            <p:txEl>
+                                              <p:pRg st="7" end="7"/>
+                                            </p:txEl>
+                                          </p:spTgt>
+                                        </p:tgtEl>
+                                        <p:attrNameLst>
+                                          <p:attrName>style.visibility</p:attrName>
+                                        </p:attrNameLst>
+                                      </p:cBhvr>
+                                      <p:to>
+                                        <p:strVal val="visible"/>
+                                      </p:to>
+                                    </p:set>
+                                  </p:childTnLst>
+                                </p:cTn>
+                              </p:par>
+                            </p:childTnLst>
+                          </p:cTn>
+                        </p:par>
+                      </p:childTnLst>
+                    </p:cTn>
+                  </p:par>
+                  <p:par>
+                    <p:cTn id="37" fill="hold">
+                      <p:stCondLst>
+                        <p:cond delay="indefinite"/>
+                      </p:stCondLst>
+                      <p:childTnLst>
+                        <p:par>
+                          <p:cTn id="38" fill="hold">
+                            <p:stCondLst>
+                              <p:cond delay="0"/>
+                            </p:stCondLst>
+                            <p:childTnLst>
+                              <p:par>
+                                <p:cTn id="39" presetClass="entr" nodeType="clickEffect" presetSubtype="0" presetID="1" grpId="1" fill="hold">
+                                  <p:stCondLst>
+                                    <p:cond delay="0"/>
+                                  </p:stCondLst>
+                                  <p:iterate type="el" backwards="0">
+                                    <p:tmAbs val="0"/>
+                                  </p:iterate>
+                                  <p:childTnLst>
+                                    <p:set>
+                                      <p:cBhvr>
+                                        <p:cTn id="40" fill="hold"/>
+                                        <p:tgtEl>
+                                          <p:spTgt spid="135">
+                                            <p:txEl>
+                                              <p:pRg st="8" end="8"/>
+                                            </p:txEl>
+                                          </p:spTgt>
+                                        </p:tgtEl>
+                                        <p:attrNameLst>
+                                          <p:attrName>style.visibility</p:attrName>
+                                        </p:attrNameLst>
+                                      </p:cBhvr>
+                                      <p:to>
+                                        <p:strVal val="visible"/>
+                                      </p:to>
+                                    </p:set>
+                                  </p:childTnLst>
+                                </p:cTn>
+                              </p:par>
+                            </p:childTnLst>
+                          </p:cTn>
+                        </p:par>
+                      </p:childTnLst>
+                    </p:cTn>
+                  </p:par>
                 </p:childTnLst>
               </p:cTn>
               <p:prevCondLst>
@@ -11797,8 +11960,26 @@
                                   </p:childTnLst>
                                 </p:cTn>
                               </p:par>
+                            </p:childTnLst>
+                          </p:cTn>
+                        </p:par>
+                      </p:childTnLst>
+                    </p:cTn>
+                  </p:par>
+                  <p:par>
+                    <p:cTn id="9" fill="hold">
+                      <p:stCondLst>
+                        <p:cond delay="indefinite"/>
+                      </p:stCondLst>
+                      <p:childTnLst>
+                        <p:par>
+                          <p:cTn id="10" fill="hold">
+                            <p:stCondLst>
+                              <p:cond delay="0"/>
+                            </p:stCondLst>
+                            <p:childTnLst>
                               <p:par>
-                                <p:cTn id="9" presetClass="entr" nodeType="withEffect" presetSubtype="0" presetID="1" grpId="1" fill="hold">
+                                <p:cTn id="11" presetClass="entr" nodeType="clickEffect" presetSubtype="0" presetID="1" grpId="1" fill="hold">
                                   <p:stCondLst>
                                     <p:cond delay="0"/>
                                   </p:stCondLst>
@@ -11808,7 +11989,7 @@
                                   <p:childTnLst>
                                     <p:set>
                                       <p:cBhvr>
-                                        <p:cTn id="10" fill="hold"/>
+                                        <p:cTn id="12" fill="hold"/>
                                         <p:tgtEl>
                                           <p:spTgt spid="141">
                                             <p:txEl>
@@ -11827,8 +12008,26 @@
                                   </p:childTnLst>
                                 </p:cTn>
                               </p:par>
+                            </p:childTnLst>
+                          </p:cTn>
+                        </p:par>
+                      </p:childTnLst>
+                    </p:cTn>
+                  </p:par>
+                  <p:par>
+                    <p:cTn id="13" fill="hold">
+                      <p:stCondLst>
+                        <p:cond delay="indefinite"/>
+                      </p:stCondLst>
+                      <p:childTnLst>
+                        <p:par>
+                          <p:cTn id="14" fill="hold">
+                            <p:stCondLst>
+                              <p:cond delay="0"/>
+                            </p:stCondLst>
+                            <p:childTnLst>
                               <p:par>
-                                <p:cTn id="11" presetClass="entr" nodeType="withEffect" presetSubtype="0" presetID="1" grpId="1" fill="hold">
+                                <p:cTn id="15" presetClass="entr" nodeType="clickEffect" presetSubtype="0" presetID="1" grpId="1" fill="hold">
                                   <p:stCondLst>
                                     <p:cond delay="0"/>
                                   </p:stCondLst>
@@ -11838,7 +12037,7 @@
                                   <p:childTnLst>
                                     <p:set>
                                       <p:cBhvr>
-                                        <p:cTn id="12" fill="hold"/>
+                                        <p:cTn id="16" fill="hold"/>
                                         <p:tgtEl>
                                           <p:spTgt spid="141">
                                             <p:txEl>
@@ -11857,8 +12056,26 @@
                                   </p:childTnLst>
                                 </p:cTn>
                               </p:par>
+                            </p:childTnLst>
+                          </p:cTn>
+                        </p:par>
+                      </p:childTnLst>
+                    </p:cTn>
+                  </p:par>
+                  <p:par>
+                    <p:cTn id="17" fill="hold">
+                      <p:stCondLst>
+                        <p:cond delay="indefinite"/>
+                      </p:stCondLst>
+                      <p:childTnLst>
+                        <p:par>
+                          <p:cTn id="18" fill="hold">
+                            <p:stCondLst>
+                              <p:cond delay="0"/>
+                            </p:stCondLst>
+                            <p:childTnLst>
                               <p:par>
-                                <p:cTn id="13" presetClass="entr" nodeType="withEffect" presetSubtype="0" presetID="1" grpId="1" fill="hold">
+                                <p:cTn id="19" presetClass="entr" nodeType="clickEffect" presetSubtype="0" presetID="1" grpId="1" fill="hold">
                                   <p:stCondLst>
                                     <p:cond delay="0"/>
                                   </p:stCondLst>
@@ -11868,7 +12085,7 @@
                                   <p:childTnLst>
                                     <p:set>
                                       <p:cBhvr>
-                                        <p:cTn id="14" fill="hold"/>
+                                        <p:cTn id="20" fill="hold"/>
                                         <p:tgtEl>
                                           <p:spTgt spid="141">
                                             <p:txEl>
@@ -11894,19 +12111,19 @@
                     </p:cTn>
                   </p:par>
                   <p:par>
-                    <p:cTn id="15" fill="hold">
+                    <p:cTn id="21" fill="hold">
                       <p:stCondLst>
                         <p:cond delay="indefinite"/>
                       </p:stCondLst>
                       <p:childTnLst>
                         <p:par>
-                          <p:cTn id="16" fill="hold">
+                          <p:cTn id="22" fill="hold">
                             <p:stCondLst>
                               <p:cond delay="0"/>
                             </p:stCondLst>
                             <p:childTnLst>
                               <p:par>
-                                <p:cTn id="17" presetClass="entr" nodeType="clickEffect" presetSubtype="0" presetID="1" grpId="1" fill="hold">
+                                <p:cTn id="23" presetClass="entr" nodeType="clickEffect" presetSubtype="0" presetID="1" grpId="1" fill="hold">
                                   <p:stCondLst>
                                     <p:cond delay="0"/>
                                   </p:stCondLst>
@@ -11916,7 +12133,7 @@
                                   <p:childTnLst>
                                     <p:set>
                                       <p:cBhvr>
-                                        <p:cTn id="18" fill="hold"/>
+                                        <p:cTn id="24" fill="hold"/>
                                         <p:tgtEl>
                                           <p:spTgt spid="141">
                                             <p:txEl>
@@ -11935,8 +12152,26 @@
                                   </p:childTnLst>
                                 </p:cTn>
                               </p:par>
+                            </p:childTnLst>
+                          </p:cTn>
+                        </p:par>
+                      </p:childTnLst>
+                    </p:cTn>
+                  </p:par>
+                  <p:par>
+                    <p:cTn id="25" fill="hold">
+                      <p:stCondLst>
+                        <p:cond delay="indefinite"/>
+                      </p:stCondLst>
+                      <p:childTnLst>
+                        <p:par>
+                          <p:cTn id="26" fill="hold">
+                            <p:stCondLst>
+                              <p:cond delay="0"/>
+                            </p:stCondLst>
+                            <p:childTnLst>
                               <p:par>
-                                <p:cTn id="19" presetClass="entr" nodeType="withEffect" presetSubtype="0" presetID="1" grpId="1" fill="hold">
+                                <p:cTn id="27" presetClass="entr" nodeType="clickEffect" presetSubtype="0" presetID="1" grpId="1" fill="hold">
                                   <p:stCondLst>
                                     <p:cond delay="0"/>
                                   </p:stCondLst>
@@ -11946,7 +12181,7 @@
                                   <p:childTnLst>
                                     <p:set>
                                       <p:cBhvr>
-                                        <p:cTn id="20" fill="hold"/>
+                                        <p:cTn id="28" fill="hold"/>
                                         <p:tgtEl>
                                           <p:spTgt spid="141">
                                             <p:txEl>
@@ -11965,8 +12200,26 @@
                                   </p:childTnLst>
                                 </p:cTn>
                               </p:par>
+                            </p:childTnLst>
+                          </p:cTn>
+                        </p:par>
+                      </p:childTnLst>
+                    </p:cTn>
+                  </p:par>
+                  <p:par>
+                    <p:cTn id="29" fill="hold">
+                      <p:stCondLst>
+                        <p:cond delay="indefinite"/>
+                      </p:stCondLst>
+                      <p:childTnLst>
+                        <p:par>
+                          <p:cTn id="30" fill="hold">
+                            <p:stCondLst>
+                              <p:cond delay="0"/>
+                            </p:stCondLst>
+                            <p:childTnLst>
                               <p:par>
-                                <p:cTn id="21" presetClass="entr" nodeType="withEffect" presetSubtype="0" presetID="1" grpId="1" fill="hold">
+                                <p:cTn id="31" presetClass="entr" nodeType="clickEffect" presetSubtype="0" presetID="1" grpId="1" fill="hold">
                                   <p:stCondLst>
                                     <p:cond delay="0"/>
                                   </p:stCondLst>
@@ -11976,7 +12229,7 @@
                                   <p:childTnLst>
                                     <p:set>
                                       <p:cBhvr>
-                                        <p:cTn id="22" fill="hold"/>
+                                        <p:cTn id="32" fill="hold"/>
                                         <p:tgtEl>
                                           <p:spTgt spid="141">
                                             <p:txEl>
@@ -11995,8 +12248,26 @@
                                   </p:childTnLst>
                                 </p:cTn>
                               </p:par>
+                            </p:childTnLst>
+                          </p:cTn>
+                        </p:par>
+                      </p:childTnLst>
+                    </p:cTn>
+                  </p:par>
+                  <p:par>
+                    <p:cTn id="33" fill="hold">
+                      <p:stCondLst>
+                        <p:cond delay="indefinite"/>
+                      </p:stCondLst>
+                      <p:childTnLst>
+                        <p:par>
+                          <p:cTn id="34" fill="hold">
+                            <p:stCondLst>
+                              <p:cond delay="0"/>
+                            </p:stCondLst>
+                            <p:childTnLst>
                               <p:par>
-                                <p:cTn id="23" presetClass="entr" nodeType="withEffect" presetSubtype="0" presetID="1" grpId="1" fill="hold">
+                                <p:cTn id="35" presetClass="entr" nodeType="clickEffect" presetSubtype="0" presetID="1" grpId="1" fill="hold">
                                   <p:stCondLst>
                                     <p:cond delay="0"/>
                                   </p:stCondLst>
@@ -12006,7 +12277,7 @@
                                   <p:childTnLst>
                                     <p:set>
                                       <p:cBhvr>
-                                        <p:cTn id="24" fill="hold"/>
+                                        <p:cTn id="36" fill="hold"/>
                                         <p:tgtEl>
                                           <p:spTgt spid="141">
                                             <p:txEl>
@@ -12053,7 +12324,7 @@
       </p:par>
     </p:tnLst>
     <p:bldLst>
-      <p:bldP build="p" bldLvl="1" animBg="1" rev="0" advAuto="0" spid="141" grpId="1"/>
+      <p:bldP build="p" bldLvl="5" animBg="1" rev="0" advAuto="0" spid="141" grpId="1"/>
     </p:bldLst>
   </p:timing>
 </p:sld>
@@ -13647,7 +13918,7 @@
               </a:defRPr>
             </a:pPr>
             <a:r>
-              <a:t>From pactical point of view:</a:t>
+              <a:t>From practical point of view:</a:t>
             </a:r>
           </a:p>
           <a:p>

</xml_diff>